<commit_message>
First page Info changed and COCOMO updation
</commit_message>
<xml_diff>
--- a/Documentation/COCOMO for Project.pptx
+++ b/Documentation/COCOMO for Project.pptx
@@ -266,7 +266,7 @@
           <a:p>
             <a:fld id="{EF99DC4A-ADC4-4946-B6E8-684FD305C172}" type="datetimeFigureOut">
               <a:rPr lang="en-US" smtClean="0"/>
-              <a:t>12/6/2019</a:t>
+              <a:t>2/12/2020</a:t>
             </a:fld>
             <a:endParaRPr lang="en-US"/>
           </a:p>
@@ -464,7 +464,7 @@
           <a:p>
             <a:fld id="{EF99DC4A-ADC4-4946-B6E8-684FD305C172}" type="datetimeFigureOut">
               <a:rPr lang="en-US" smtClean="0"/>
-              <a:t>12/6/2019</a:t>
+              <a:t>2/12/2020</a:t>
             </a:fld>
             <a:endParaRPr lang="en-US"/>
           </a:p>
@@ -672,7 +672,7 @@
           <a:p>
             <a:fld id="{EF99DC4A-ADC4-4946-B6E8-684FD305C172}" type="datetimeFigureOut">
               <a:rPr lang="en-US" smtClean="0"/>
-              <a:t>12/6/2019</a:t>
+              <a:t>2/12/2020</a:t>
             </a:fld>
             <a:endParaRPr lang="en-US"/>
           </a:p>
@@ -870,7 +870,7 @@
           <a:p>
             <a:fld id="{EF99DC4A-ADC4-4946-B6E8-684FD305C172}" type="datetimeFigureOut">
               <a:rPr lang="en-US" smtClean="0"/>
-              <a:t>12/6/2019</a:t>
+              <a:t>2/12/2020</a:t>
             </a:fld>
             <a:endParaRPr lang="en-US"/>
           </a:p>
@@ -1145,7 +1145,7 @@
           <a:p>
             <a:fld id="{EF99DC4A-ADC4-4946-B6E8-684FD305C172}" type="datetimeFigureOut">
               <a:rPr lang="en-US" smtClean="0"/>
-              <a:t>12/6/2019</a:t>
+              <a:t>2/12/2020</a:t>
             </a:fld>
             <a:endParaRPr lang="en-US"/>
           </a:p>
@@ -1410,7 +1410,7 @@
           <a:p>
             <a:fld id="{EF99DC4A-ADC4-4946-B6E8-684FD305C172}" type="datetimeFigureOut">
               <a:rPr lang="en-US" smtClean="0"/>
-              <a:t>12/6/2019</a:t>
+              <a:t>2/12/2020</a:t>
             </a:fld>
             <a:endParaRPr lang="en-US"/>
           </a:p>
@@ -1822,7 +1822,7 @@
           <a:p>
             <a:fld id="{EF99DC4A-ADC4-4946-B6E8-684FD305C172}" type="datetimeFigureOut">
               <a:rPr lang="en-US" smtClean="0"/>
-              <a:t>12/6/2019</a:t>
+              <a:t>2/12/2020</a:t>
             </a:fld>
             <a:endParaRPr lang="en-US"/>
           </a:p>
@@ -1963,7 +1963,7 @@
           <a:p>
             <a:fld id="{EF99DC4A-ADC4-4946-B6E8-684FD305C172}" type="datetimeFigureOut">
               <a:rPr lang="en-US" smtClean="0"/>
-              <a:t>12/6/2019</a:t>
+              <a:t>2/12/2020</a:t>
             </a:fld>
             <a:endParaRPr lang="en-US"/>
           </a:p>
@@ -2076,7 +2076,7 @@
           <a:p>
             <a:fld id="{EF99DC4A-ADC4-4946-B6E8-684FD305C172}" type="datetimeFigureOut">
               <a:rPr lang="en-US" smtClean="0"/>
-              <a:t>12/6/2019</a:t>
+              <a:t>2/12/2020</a:t>
             </a:fld>
             <a:endParaRPr lang="en-US"/>
           </a:p>
@@ -2387,7 +2387,7 @@
           <a:p>
             <a:fld id="{EF99DC4A-ADC4-4946-B6E8-684FD305C172}" type="datetimeFigureOut">
               <a:rPr lang="en-US" smtClean="0"/>
-              <a:t>12/6/2019</a:t>
+              <a:t>2/12/2020</a:t>
             </a:fld>
             <a:endParaRPr lang="en-US"/>
           </a:p>
@@ -2675,7 +2675,7 @@
           <a:p>
             <a:fld id="{EF99DC4A-ADC4-4946-B6E8-684FD305C172}" type="datetimeFigureOut">
               <a:rPr lang="en-US" smtClean="0"/>
-              <a:t>12/6/2019</a:t>
+              <a:t>2/12/2020</a:t>
             </a:fld>
             <a:endParaRPr lang="en-US"/>
           </a:p>
@@ -2916,7 +2916,7 @@
           <a:p>
             <a:fld id="{EF99DC4A-ADC4-4946-B6E8-684FD305C172}" type="datetimeFigureOut">
               <a:rPr lang="en-US" smtClean="0"/>
-              <a:t>12/6/2019</a:t>
+              <a:t>2/12/2020</a:t>
             </a:fld>
             <a:endParaRPr lang="en-US"/>
           </a:p>
@@ -5248,12 +5248,12 @@
                         </a:spcAft>
                       </a:pPr>
                       <a:r>
-                        <a:rPr lang="en-US" sz="2000">
+                        <a:rPr lang="en-US" sz="2000" dirty="0">
                           <a:effectLst/>
                         </a:rPr>
                         <a:t>External Inquiry</a:t>
                       </a:r>
-                      <a:endParaRPr lang="en-US" sz="1800">
+                      <a:endParaRPr lang="en-US" sz="1800" dirty="0">
                         <a:effectLst/>
                         <a:latin typeface="Calibri" panose="020F0502020204030204" pitchFamily="34" charset="0"/>
                         <a:ea typeface="Calibri" panose="020F0502020204030204" pitchFamily="34" charset="0"/>
@@ -6430,7 +6430,7 @@
         </p:nvSpPr>
         <p:spPr>
           <a:xfrm>
-            <a:off x="6522139" y="5772358"/>
+            <a:off x="7436539" y="5772358"/>
             <a:ext cx="927653" cy="318052"/>
           </a:xfrm>
           <a:prstGeom prst="rect">
@@ -6484,7 +6484,7 @@
         </p:nvSpPr>
         <p:spPr>
           <a:xfrm>
-            <a:off x="6522139" y="6106589"/>
+            <a:off x="7436540" y="6093337"/>
             <a:ext cx="927653" cy="318052"/>
           </a:xfrm>
           <a:prstGeom prst="rect">
@@ -6642,7 +6642,7 @@
             <a:pPr algn="ctr"/>
             <a:r>
               <a:rPr lang="en-US" sz="2400" dirty="0"/>
-              <a:t>0.69</a:t>
+              <a:t>0.74</a:t>
             </a:r>
           </a:p>
         </p:txBody>
@@ -6806,13 +6806,13 @@
             </a:r>
             <a:r>
               <a:rPr lang="en-US" sz="2000" dirty="0"/>
-              <a:t> * 0.69 = 15.4 [man-months]</a:t>
+              <a:t> * 0.74 = 16.5 [man-months]</a:t>
             </a:r>
           </a:p>
           <a:p>
             <a:r>
               <a:rPr lang="en-US" sz="2000" dirty="0"/>
-              <a:t>Development Time = 2.5 * (15.4) </a:t>
+              <a:t>Development Time = 2.5 * (16.5) </a:t>
             </a:r>
             <a:r>
               <a:rPr lang="en-US" sz="2000" baseline="30000" dirty="0"/>
@@ -6820,13 +6820,13 @@
             </a:r>
             <a:r>
               <a:rPr lang="en-US" sz="2000" dirty="0"/>
-              <a:t> = 6.5 months</a:t>
+              <a:t> = 6.7 months</a:t>
             </a:r>
           </a:p>
           <a:p>
             <a:r>
               <a:rPr lang="en-US" sz="2000" dirty="0"/>
-              <a:t>People Required = 15.4/6.5 = 2.4 people</a:t>
+              <a:t>People Required = 16.5/6.7 = 2.5 people</a:t>
             </a:r>
             <a:br>
               <a:rPr lang="en-US" sz="2000" dirty="0"/>
@@ -6842,7 +6842,7 @@
           <a:p>
             <a:r>
               <a:rPr lang="en-US" sz="2000" dirty="0"/>
-              <a:t>Development Time = 15.4/5 = 3.1 months</a:t>
+              <a:t>Development Time = 16.5/5 = 3.3 months</a:t>
             </a:r>
             <a:br>
               <a:rPr lang="en-US" sz="2000" dirty="0"/>
@@ -7076,9 +7076,9 @@
             <p:nvPr/>
           </p:nvSpPr>
           <p:spPr>
-            <a:xfrm>
-              <a:off x="7717941" y="2226843"/>
-              <a:ext cx="296876" cy="369332"/>
+            <a:xfrm flipH="1">
+              <a:off x="7679221" y="2226843"/>
+              <a:ext cx="145774" cy="369332"/>
             </a:xfrm>
             <a:prstGeom prst="rect">
               <a:avLst/>
@@ -7086,7 +7086,7 @@
             <a:noFill/>
           </p:spPr>
           <p:txBody>
-            <a:bodyPr wrap="none" rtlCol="0">
+            <a:bodyPr wrap="square" rtlCol="0">
               <a:spAutoFit/>
             </a:bodyPr>
             <a:lstStyle/>

</xml_diff>